<commit_message>
updated PP and Real_World Cars
</commit_message>
<xml_diff>
--- a/PowerPoint/assessment_9_PPTX.pptx
+++ b/PowerPoint/assessment_9_PPTX.pptx
@@ -139,8 +139,8 @@
   <p1510:revLst>
     <p1510:client id="{33250713-F807-406F-A481-E56BEDFD20D5}" v="819" dt="2023-04-30T01:34:48.919"/>
     <p1510:client id="{405A03F2-A07C-491B-9F26-B5651638B4EC}" v="327" dt="2023-04-30T18:19:45.149"/>
-    <p1510:client id="{454EAC6E-F953-4904-B2CA-4DF024DCE6E3}" v="446" dt="2023-04-30T19:12:16.832"/>
-    <p1510:client id="{87AD7A9C-B999-431B-81F2-BCAA5B1E4779}" v="458" dt="2023-04-30T18:47:10.396"/>
+    <p1510:client id="{454EAC6E-F953-4904-B2CA-4DF024DCE6E3}" v="450" dt="2023-04-30T19:13:27.818"/>
+    <p1510:client id="{87AD7A9C-B999-431B-81F2-BCAA5B1E4779}" v="637" dt="2023-05-01T02:10:05.164"/>
     <p1510:client id="{D5F9512C-50D5-4DDE-BED8-D0741F806331}" v="149" dt="2023-04-30T18:43:49.987"/>
     <p1510:client id="{E353D9C0-D7A5-4304-B133-0D8BEF929412}" v="841" dt="2023-04-29T21:36:17.225"/>
   </p1510:revLst>
@@ -13408,7 +13408,7 @@
               </a:rPr>
             </a:br>
             <a:r>
-              <a:rPr lang="en-US" sz="5100" b="1" dirty="0">
+              <a:rPr lang="en-US" sz="5100" b="1">
                 <a:solidFill>
                   <a:srgbClr val="FFFFFF"/>
                 </a:solidFill>
@@ -13417,7 +13417,7 @@
               <a:t>Random Forest</a:t>
             </a:r>
             <a:r>
-              <a:rPr lang="en-US" sz="5100" dirty="0">
+              <a:rPr lang="en-US" sz="5100">
                 <a:solidFill>
                   <a:srgbClr val="FFFFFF"/>
                 </a:solidFill>
@@ -13436,7 +13436,7 @@
               </a:rPr>
             </a:br>
             <a:r>
-              <a:rPr lang="en-US" sz="4000" i="1" dirty="0">
+              <a:rPr lang="en-US" sz="4000" i="1">
                 <a:solidFill>
                   <a:srgbClr val="FFFFFF"/>
                 </a:solidFill>
@@ -13444,7 +13444,7 @@
               </a:rPr>
               <a:t>The Sentinels</a:t>
             </a:r>
-            <a:endParaRPr lang="en-US" sz="4000" i="1" dirty="0">
+            <a:endParaRPr lang="en-US" sz="4000" i="1">
               <a:solidFill>
                 <a:srgbClr val="FFFFFF"/>
               </a:solidFill>
@@ -13477,7 +13477,7 @@
           <a:lstStyle/>
           <a:p>
             <a:r>
-              <a:rPr lang="en-US" sz="1400" dirty="0">
+              <a:rPr lang="en-US" sz="1400">
                 <a:solidFill>
                   <a:srgbClr val="FFFFFF"/>
                 </a:solidFill>
@@ -13485,7 +13485,7 @@
               </a:rPr>
               <a:t>Tristen Brewer</a:t>
             </a:r>
-            <a:endParaRPr lang="en-US" sz="1400" dirty="0">
+            <a:endParaRPr lang="en-US" sz="1400">
               <a:solidFill>
                 <a:srgbClr val="FFFFFF"/>
               </a:solidFill>
@@ -13495,7 +13495,7 @@
           </a:p>
           <a:p>
             <a:r>
-              <a:rPr lang="en-US" sz="1400" dirty="0">
+              <a:rPr lang="en-US" sz="1400">
                 <a:solidFill>
                   <a:srgbClr val="FFFFFF"/>
                 </a:solidFill>
@@ -13503,7 +13503,7 @@
               </a:rPr>
               <a:t>Nicholas Fenech</a:t>
             </a:r>
-            <a:endParaRPr lang="en-US" sz="1400" dirty="0">
+            <a:endParaRPr lang="en-US" sz="1400">
               <a:solidFill>
                 <a:srgbClr val="FFFFFF"/>
               </a:solidFill>
@@ -13513,7 +13513,7 @@
           </a:p>
           <a:p>
             <a:r>
-              <a:rPr lang="en-US" sz="1400" dirty="0">
+              <a:rPr lang="en-US" sz="1400">
                 <a:solidFill>
                   <a:srgbClr val="FFFFFF"/>
                 </a:solidFill>
@@ -13521,7 +13521,7 @@
               </a:rPr>
               <a:t>Janeel Abrahams</a:t>
             </a:r>
-            <a:endParaRPr lang="en-US" sz="1400" dirty="0">
+            <a:endParaRPr lang="en-US" sz="1400">
               <a:solidFill>
                 <a:srgbClr val="FFFFFF"/>
               </a:solidFill>
@@ -15510,7 +15510,7 @@
         <p:spPr>
           <a:xfrm>
             <a:off x="880782" y="3773244"/>
-            <a:ext cx="7505700" cy="2034540"/>
+            <a:ext cx="7561729" cy="2034540"/>
           </a:xfrm>
           <a:prstGeom prst="rect">
             <a:avLst/>
@@ -16656,13 +16656,13 @@
           <a:lstStyle/>
           <a:p>
             <a:r>
-              <a:rPr lang="en-US" sz="2800" dirty="0">
+              <a:rPr lang="en-US" sz="2800">
                 <a:ea typeface="Calibri Light"/>
                 <a:cs typeface="Calibri Light"/>
               </a:rPr>
               <a:t>Tuning Hyperparameters for Maximum Potential – Real World Cars</a:t>
             </a:r>
-            <a:endParaRPr lang="en-US" dirty="0"/>
+            <a:endParaRPr lang="en-US"/>
           </a:p>
         </p:txBody>
       </p:sp>
@@ -16754,7 +16754,7 @@
           <a:lstStyle/>
           <a:p>
             <a:r>
-              <a:rPr lang="en-US" sz="2800" dirty="0">
+              <a:rPr lang="en-US" sz="2800">
                 <a:ea typeface="Calibri Light"/>
                 <a:cs typeface="Calibri Light"/>
               </a:rPr>
@@ -16762,7 +16762,7 @@
             </a:r>
           </a:p>
           <a:p>
-            <a:endParaRPr lang="en-US" dirty="0">
+            <a:endParaRPr lang="en-US">
               <a:ea typeface="Calibri Light"/>
               <a:cs typeface="Calibri Light"/>
             </a:endParaRPr>
@@ -16794,16 +16794,16 @@
         <p:spPr>
           <a:xfrm>
             <a:off x="1144716" y="583848"/>
-            <a:ext cx="10335308" cy="5113337"/>
+            <a:ext cx="9855531" cy="4868745"/>
           </a:xfrm>
         </p:spPr>
       </p:pic>
       <p:pic>
         <p:nvPicPr>
-          <p:cNvPr id="5" name="Picture 5" descr="Text&#10;&#10;Description automatically generated">
+          <p:cNvPr id="6" name="Picture 6" descr="Graphical user interface, text&#10;&#10;Description automatically generated">
             <a:extLst>
               <a:ext uri="{FF2B5EF4-FFF2-40B4-BE49-F238E27FC236}">
-                <a16:creationId xmlns:a16="http://schemas.microsoft.com/office/drawing/2014/main" id="{1C4DB9C7-F48C-A2B1-5B88-19D5460841FF}"/>
+                <a16:creationId xmlns:a16="http://schemas.microsoft.com/office/drawing/2014/main" id="{E1BCB8DC-0E94-FCF2-C381-81584BFEEFC7}"/>
               </a:ext>
             </a:extLst>
           </p:cNvPr>
@@ -16820,8 +16820,8 @@
         </p:blipFill>
         <p:spPr>
           <a:xfrm>
-            <a:off x="1196623" y="5757335"/>
-            <a:ext cx="10325570" cy="667927"/>
+            <a:off x="1140180" y="5454539"/>
+            <a:ext cx="9845791" cy="643216"/>
           </a:xfrm>
           <a:prstGeom prst="rect">
             <a:avLst/>
@@ -16956,13 +16956,13 @@
           <a:p>
             <a:pPr algn="ctr"/>
             <a:r>
-              <a:rPr lang="en-US" sz="2800" dirty="0">
+              <a:rPr lang="en-US" sz="2800">
                 <a:ea typeface="Calibri Light"/>
                 <a:cs typeface="Calibri Light"/>
               </a:rPr>
               <a:t>Tuning Hyperparameters for Maximum Potential – Real World Cars-Cont'd</a:t>
             </a:r>
-            <a:endParaRPr lang="en-US" sz="2800" dirty="0"/>
+            <a:endParaRPr lang="en-US" sz="2800"/>
           </a:p>
         </p:txBody>
       </p:sp>
@@ -16985,12 +16985,12 @@
         <p:spPr>
           <a:xfrm>
             <a:off x="51038" y="1664346"/>
-            <a:ext cx="2165339" cy="1836561"/>
+            <a:ext cx="2165339" cy="3115968"/>
           </a:xfrm>
         </p:spPr>
         <p:txBody>
           <a:bodyPr anchor="ctr">
-            <a:normAutofit lnSpcReduction="10000"/>
+            <a:normAutofit/>
           </a:bodyPr>
           <a:lstStyle/>
           <a:p>
@@ -17020,7 +17020,17 @@
                 <a:ea typeface="Calibri"/>
                 <a:cs typeface="Calibri"/>
               </a:rPr>
-              <a:t>Post-tuned R-Squared = 90%</a:t>
+              <a:t>Post-tuned R-Squared = 89%</a:t>
+            </a:r>
+          </a:p>
+          <a:p>
+            <a:pPr algn="ctr"/>
+            <a:r>
+              <a:rPr lang="en-US" sz="2000" dirty="0">
+                <a:ea typeface="Calibri"/>
+                <a:cs typeface="Calibri"/>
+              </a:rPr>
+              <a:t>Mean Absolute Error = $991</a:t>
             </a:r>
           </a:p>
         </p:txBody>
@@ -18698,8 +18708,8 @@
         </p:nvSpPr>
         <p:spPr>
           <a:xfrm>
-            <a:off x="630936" y="639520"/>
-            <a:ext cx="3429000" cy="1719072"/>
+            <a:off x="640962" y="168284"/>
+            <a:ext cx="2526633" cy="2501123"/>
           </a:xfrm>
         </p:spPr>
         <p:txBody>
@@ -18709,13 +18719,13 @@
           <a:lstStyle/>
           <a:p>
             <a:r>
-              <a:rPr lang="en-US" sz="2600" dirty="0">
+              <a:rPr lang="en-US" sz="2600">
                 <a:ea typeface="+mj-lt"/>
                 <a:cs typeface="+mj-lt"/>
               </a:rPr>
               <a:t>Tuning Hyperparameters for Maximum Potential – Real World Cars-Cont'd</a:t>
             </a:r>
-            <a:endParaRPr lang="en-US" sz="2600" dirty="0"/>
+            <a:endParaRPr lang="en-US" sz="2600"/>
           </a:p>
         </p:txBody>
       </p:sp>
@@ -19010,8 +19020,8 @@
         </p:nvSpPr>
         <p:spPr>
           <a:xfrm>
-            <a:off x="630936" y="2807208"/>
-            <a:ext cx="3429000" cy="3410712"/>
+            <a:off x="405159" y="2807208"/>
+            <a:ext cx="2421541" cy="3982212"/>
           </a:xfrm>
         </p:spPr>
         <p:txBody>
@@ -19034,7 +19044,16 @@
                 <a:ea typeface="Calibri"/>
                 <a:cs typeface="Calibri"/>
               </a:rPr>
-              <a:t>R-Squared = 61%</a:t>
+              <a:t>R-Squared = 65%</a:t>
+            </a:r>
+          </a:p>
+          <a:p>
+            <a:r>
+              <a:rPr lang="en-US" sz="2200" dirty="0">
+                <a:ea typeface="Calibri"/>
+                <a:cs typeface="Calibri"/>
+              </a:rPr>
+              <a:t>Mean Absolute Error = 2441</a:t>
             </a:r>
           </a:p>
           <a:p>
@@ -19073,8 +19092,8 @@
         </p:blipFill>
         <p:spPr>
           <a:xfrm>
-            <a:off x="4193333" y="740181"/>
-            <a:ext cx="7759794" cy="5387044"/>
+            <a:off x="3090440" y="168682"/>
+            <a:ext cx="8862687" cy="6159069"/>
           </a:xfrm>
           <a:prstGeom prst="rect">
             <a:avLst/>
@@ -20747,7 +20766,7 @@
           </a:bodyPr>
           <a:lstStyle/>
           <a:p>
-            <a:endParaRPr lang="en-US" sz="1500" dirty="0">
+            <a:endParaRPr lang="en-US" sz="1500">
               <a:ea typeface="Calibri"/>
               <a:cs typeface="Calibri"/>
             </a:endParaRPr>
@@ -20883,6 +20902,29 @@
               <a:t>https://towardsdatascience.com/3-challenges-of-random-forest-and-how-to-overcome-them-7dde3f50f26c</a:t>
             </a:r>
             <a:endParaRPr lang="en-US" sz="1500" dirty="0"/>
+          </a:p>
+          <a:p>
+            <a:r>
+              <a:rPr lang="en-US" sz="1500">
+                <a:ea typeface="Calibri"/>
+                <a:cs typeface="Calibri"/>
+              </a:rPr>
+              <a:t>Scikit Learn : </a:t>
+            </a:r>
+            <a:r>
+              <a:rPr lang="en-US" sz="1500" dirty="0">
+                <a:ea typeface="+mn-lt"/>
+                <a:cs typeface="+mn-lt"/>
+                <a:hlinkClick r:id="rId9"/>
+              </a:rPr>
+              <a:t>https://scikit-learn.org/stable/modules/ensemble.html#random-forestshttps://scikit-learn.org/stable/modules/ensemble.html#random-forests</a:t>
+            </a:r>
+          </a:p>
+          <a:p>
+            <a:endParaRPr lang="en-US" sz="1500" dirty="0">
+              <a:ea typeface="Calibri"/>
+              <a:cs typeface="Calibri"/>
+            </a:endParaRPr>
           </a:p>
           <a:p>
             <a:endParaRPr lang="en-US" sz="1500">
@@ -23730,19 +23772,6 @@
                 <a:spcPct val="200000"/>
               </a:lnSpc>
             </a:pPr>
-            <a:r>
-              <a:rPr lang="en-US" sz="2200">
-                <a:cs typeface="Calibri"/>
-              </a:rPr>
-              <a:t>Random subspace Method</a:t>
-            </a:r>
-          </a:p>
-          <a:p>
-            <a:pPr>
-              <a:lnSpc>
-                <a:spcPct val="200000"/>
-              </a:lnSpc>
-            </a:pPr>
             <a:endParaRPr lang="en-US" sz="2200">
               <a:cs typeface="Calibri"/>
             </a:endParaRPr>
@@ -26288,8 +26317,8 @@
         </p:nvSpPr>
         <p:spPr>
           <a:xfrm>
-            <a:off x="838200" y="1929384"/>
-            <a:ext cx="10515600" cy="4251960"/>
+            <a:off x="726688" y="1446165"/>
+            <a:ext cx="10515600" cy="4753764"/>
           </a:xfrm>
         </p:spPr>
         <p:txBody>
@@ -26298,19 +26327,13 @@
           </a:bodyPr>
           <a:lstStyle/>
           <a:p>
-            <a:pPr>
+            <a:pPr marL="0" indent="0">
               <a:lnSpc>
                 <a:spcPct val="150000"/>
               </a:lnSpc>
+              <a:buNone/>
             </a:pPr>
-            <a:r>
-              <a:rPr lang="en-US" sz="2200">
-                <a:ea typeface="+mn-lt"/>
-                <a:cs typeface="+mn-lt"/>
-              </a:rPr>
-              <a:t>Bootstrapping and averaging to reduce variance</a:t>
-            </a:r>
-            <a:endParaRPr lang="en-US" sz="2200">
+            <a:endParaRPr lang="en-US" sz="2200" dirty="0">
               <a:cs typeface="Calibri" panose="020F0502020204030204"/>
             </a:endParaRPr>
           </a:p>
@@ -26321,13 +26344,33 @@
               </a:lnSpc>
             </a:pPr>
             <a:r>
-              <a:rPr lang="en-US" sz="2200">
+              <a:rPr lang="en-US" sz="2200" dirty="0">
+                <a:cs typeface="Calibri" panose="020F0502020204030204"/>
+              </a:rPr>
+              <a:t>R Squared Score </a:t>
+            </a:r>
+            <a:endParaRPr lang="en-US" dirty="0"/>
+          </a:p>
+          <a:p>
+            <a:pPr>
+              <a:lnSpc>
+                <a:spcPct val="150000"/>
+              </a:lnSpc>
+            </a:pPr>
+            <a:r>
+              <a:rPr lang="en-US" sz="2200" dirty="0">
+                <a:solidFill>
+                  <a:srgbClr val="FFFFFF"/>
+                </a:solidFill>
                 <a:ea typeface="+mn-lt"/>
                 <a:cs typeface="+mn-lt"/>
               </a:rPr>
-              <a:t>Random feature selection to reduce correlation between trees</a:t>
+              <a:t>Mean Absolute Error</a:t>
             </a:r>
-            <a:endParaRPr lang="en-US">
+            <a:endParaRPr lang="en-US" sz="2200" dirty="0">
+              <a:solidFill>
+                <a:srgbClr val="FFFFFF"/>
+              </a:solidFill>
               <a:cs typeface="Calibri" panose="020F0502020204030204"/>
             </a:endParaRPr>
           </a:p>
@@ -26338,49 +26381,11 @@
               </a:lnSpc>
             </a:pPr>
             <a:r>
-              <a:rPr lang="en-US" sz="2200">
-                <a:ea typeface="+mn-lt"/>
-                <a:cs typeface="+mn-lt"/>
+              <a:rPr lang="en-US" sz="2200" dirty="0">
+                <a:cs typeface="Calibri" panose="020F0502020204030204"/>
               </a:rPr>
-              <a:t>Early stopping criteria to prevent overfitting</a:t>
+              <a:t>Mean Squared Error</a:t>
             </a:r>
-            <a:endParaRPr lang="en-US">
-              <a:cs typeface="Calibri" panose="020F0502020204030204"/>
-            </a:endParaRPr>
-          </a:p>
-          <a:p>
-            <a:pPr>
-              <a:lnSpc>
-                <a:spcPct val="150000"/>
-              </a:lnSpc>
-            </a:pPr>
-            <a:r>
-              <a:rPr lang="en-US" sz="2200">
-                <a:ea typeface="+mn-lt"/>
-                <a:cs typeface="+mn-lt"/>
-              </a:rPr>
-              <a:t>Limiting tree depth to prevent overfitting</a:t>
-            </a:r>
-            <a:endParaRPr lang="en-US">
-              <a:cs typeface="Calibri" panose="020F0502020204030204"/>
-            </a:endParaRPr>
-          </a:p>
-          <a:p>
-            <a:pPr>
-              <a:lnSpc>
-                <a:spcPct val="150000"/>
-              </a:lnSpc>
-            </a:pPr>
-            <a:r>
-              <a:rPr lang="en-US" sz="2200">
-                <a:ea typeface="+mn-lt"/>
-                <a:cs typeface="+mn-lt"/>
-              </a:rPr>
-              <a:t>Minimum samples required to split a node to prevent overfitting</a:t>
-            </a:r>
-            <a:endParaRPr lang="en-US">
-              <a:cs typeface="Calibri" panose="020F0502020204030204"/>
-            </a:endParaRPr>
           </a:p>
           <a:p>
             <a:pPr>
@@ -26409,7 +26414,7 @@
               </a:lnSpc>
             </a:pPr>
             <a:endParaRPr lang="en-US">
-              <a:cs typeface="Calibri" panose="020F0502020204030204"/>
+              <a:cs typeface="Calibri"/>
             </a:endParaRPr>
           </a:p>
           <a:p>
@@ -26551,13 +26556,28 @@
           <a:lstStyle/>
           <a:p>
             <a:r>
-              <a:rPr lang="en-US" sz="4200">
+              <a:rPr lang="en-US" sz="4200" dirty="0">
                 <a:ea typeface="+mj-lt"/>
                 <a:cs typeface="+mj-lt"/>
               </a:rPr>
-              <a:t>How can Random Forests be combined with other techniques to improve performance?</a:t>
+              <a:t>Random Forest </a:t>
             </a:r>
-            <a:endParaRPr lang="en-US" sz="4200"/>
+            <a:r>
+              <a:rPr lang="en-US" sz="4200" dirty="0">
+                <a:solidFill>
+                  <a:srgbClr val="FFFFFF"/>
+                </a:solidFill>
+                <a:ea typeface="+mj-lt"/>
+                <a:cs typeface="+mj-lt"/>
+              </a:rPr>
+              <a:t>Hyperparameters </a:t>
+            </a:r>
+            <a:endParaRPr lang="en-US" dirty="0">
+              <a:solidFill>
+                <a:srgbClr val="FFFFFF"/>
+              </a:solidFill>
+              <a:cs typeface="Calibri Light" panose="020F0302020204030204"/>
+            </a:endParaRPr>
           </a:p>
         </p:txBody>
       </p:sp>
@@ -27228,13 +27248,13 @@
           <a:lstStyle/>
           <a:p>
             <a:r>
-              <a:rPr lang="en-US">
+              <a:rPr lang="en-US" dirty="0">
                 <a:ea typeface="+mn-lt"/>
                 <a:cs typeface="+mn-lt"/>
               </a:rPr>
-              <a:t>Ensemble learning</a:t>
+              <a:t>Boot Strapping </a:t>
             </a:r>
-            <a:endParaRPr lang="en-US">
+            <a:endParaRPr lang="en-US" dirty="0">
               <a:cs typeface="Calibri" panose="020F0502020204030204"/>
             </a:endParaRPr>
           </a:p>
@@ -27245,13 +27265,13 @@
               </a:lnSpc>
             </a:pPr>
             <a:r>
-              <a:rPr lang="en-US">
+              <a:rPr lang="en-US" dirty="0">
                 <a:ea typeface="+mn-lt"/>
                 <a:cs typeface="+mn-lt"/>
               </a:rPr>
-              <a:t>Feature selection</a:t>
+              <a:t>Feature Selection</a:t>
             </a:r>
-            <a:endParaRPr lang="en-US">
+            <a:endParaRPr lang="en-US" dirty="0">
               <a:cs typeface="Calibri" panose="020F0502020204030204"/>
             </a:endParaRPr>
           </a:p>
@@ -27262,13 +27282,13 @@
               </a:lnSpc>
             </a:pPr>
             <a:r>
-              <a:rPr lang="en-US">
+              <a:rPr lang="en-US" dirty="0">
                 <a:ea typeface="+mn-lt"/>
                 <a:cs typeface="+mn-lt"/>
               </a:rPr>
-              <a:t>Gradient boosting</a:t>
+              <a:t>Depth </a:t>
             </a:r>
-            <a:endParaRPr lang="en-US">
+            <a:endParaRPr lang="en-US" dirty="0">
               <a:cs typeface="Calibri" panose="020F0502020204030204"/>
             </a:endParaRPr>
           </a:p>
@@ -27279,15 +27299,12 @@
               </a:lnSpc>
             </a:pPr>
             <a:r>
-              <a:rPr lang="en-US">
+              <a:rPr lang="en-US" dirty="0">
                 <a:ea typeface="+mn-lt"/>
                 <a:cs typeface="+mn-lt"/>
               </a:rPr>
-              <a:t>Imbalanced datasets</a:t>
+              <a:t>Number of Trees</a:t>
             </a:r>
-            <a:endParaRPr lang="en-US">
-              <a:cs typeface="Calibri" panose="020F0502020204030204"/>
-            </a:endParaRPr>
           </a:p>
           <a:p>
             <a:pPr>
@@ -27296,15 +27313,11 @@
               </a:lnSpc>
             </a:pPr>
             <a:r>
-              <a:rPr lang="en-US">
-                <a:ea typeface="+mn-lt"/>
-                <a:cs typeface="+mn-lt"/>
+              <a:rPr lang="en-US" dirty="0">
+                <a:cs typeface="Calibri" panose="020F0502020204030204"/>
               </a:rPr>
-              <a:t>Deep learning</a:t>
+              <a:t>and many others!  </a:t>
             </a:r>
-            <a:endParaRPr lang="en-US">
-              <a:cs typeface="Calibri" panose="020F0502020204030204"/>
-            </a:endParaRPr>
           </a:p>
         </p:txBody>
       </p:sp>

</xml_diff>